<commit_message>
Fixed the duplication Database
</commit_message>
<xml_diff>
--- a/Applicazione Web.pptx
+++ b/Applicazione Web.pptx
@@ -5,7 +5,7 @@
     <p:sldMasterId id="2147483648" r:id="rId1"/>
   </p:sldMasterIdLst>
   <p:notesMasterIdLst>
-    <p:notesMasterId r:id="rId11"/>
+    <p:notesMasterId r:id="rId12"/>
   </p:notesMasterIdLst>
   <p:sldIdLst>
     <p:sldId id="256" r:id="rId2"/>
@@ -17,6 +17,7 @@
     <p:sldId id="264" r:id="rId8"/>
     <p:sldId id="262" r:id="rId9"/>
     <p:sldId id="263" r:id="rId10"/>
+    <p:sldId id="265" r:id="rId11"/>
   </p:sldIdLst>
   <p:sldSz cx="12192000" cy="6858000"/>
   <p:notesSz cx="6858000" cy="9144000"/>
@@ -133,9 +134,13 @@
             <p14:sldId id="264"/>
             <p14:sldId id="262"/>
             <p14:sldId id="263"/>
+            <p14:sldId id="265"/>
           </p14:sldIdLst>
         </p14:section>
       </p14:sectionLst>
+    </p:ext>
+    <p:ext uri="{EFAFB233-063F-42B5-8137-9DF3F51BA10A}">
+      <p15:sldGuideLst xmlns:p15="http://schemas.microsoft.com/office/powerpoint/2012/main"/>
     </p:ext>
   </p:extLst>
 </p:presentation>
@@ -7777,9 +7782,12 @@
         </a:p>
         <a:p>
           <a:r>
-            <a:rPr lang="it-IT" dirty="0"/>
+            <a:rPr lang="it-IT" dirty="0">
+              <a:hlinkClick xmlns:r="http://schemas.openxmlformats.org/officeDocument/2006/relationships" r:id="rId1"/>
+            </a:rPr>
             <a:t>https://unsplash.com/developers#</a:t>
           </a:r>
+          <a:endParaRPr lang="it-IT" dirty="0"/>
         </a:p>
       </dgm:t>
     </dgm:pt>
@@ -7831,9 +7839,12 @@
         </a:p>
         <a:p>
           <a:r>
-            <a:rPr lang="it-IT" dirty="0"/>
+            <a:rPr lang="it-IT" dirty="0">
+              <a:hlinkClick xmlns:r="http://schemas.openxmlformats.org/officeDocument/2006/relationships" r:id="rId1"/>
+            </a:rPr>
             <a:t>https://mailtrap.io/home</a:t>
           </a:r>
+          <a:endParaRPr lang="it-IT" dirty="0"/>
         </a:p>
       </dgm:t>
     </dgm:pt>
@@ -7876,10 +7887,10 @@
       <dgm:prSet presAssocID="{901B9BCB-7854-4E42-920A-38C5ECFCDB5F}" presName="imgShp" presStyleLbl="fgImgPlace1" presStyleIdx="0" presStyleCnt="2"/>
       <dgm:spPr>
         <a:blipFill>
-          <a:blip xmlns:r="http://schemas.openxmlformats.org/officeDocument/2006/relationships" r:embed="rId1">
+          <a:blip xmlns:r="http://schemas.openxmlformats.org/officeDocument/2006/relationships" r:embed="rId2">
             <a:extLst>
               <a:ext uri="{96DAC541-7B7A-43D3-8B79-37D633B846F1}">
-                <asvg:svgBlip xmlns:asvg="http://schemas.microsoft.com/office/drawing/2016/SVG/main" r:embed="rId2"/>
+                <asvg:svgBlip xmlns:asvg="http://schemas.microsoft.com/office/drawing/2016/SVG/main" r:embed="rId3"/>
               </a:ext>
             </a:extLst>
           </a:blip>
@@ -7915,10 +7926,10 @@
       <dgm:prSet presAssocID="{0ECE81F1-F45A-4FAE-8E3E-3FD80C4C047D}" presName="imgShp" presStyleLbl="fgImgPlace1" presStyleIdx="1" presStyleCnt="2"/>
       <dgm:spPr>
         <a:blipFill>
-          <a:blip xmlns:r="http://schemas.openxmlformats.org/officeDocument/2006/relationships" r:embed="rId3">
+          <a:blip xmlns:r="http://schemas.openxmlformats.org/officeDocument/2006/relationships" r:embed="rId4">
             <a:extLst>
               <a:ext uri="{96DAC541-7B7A-43D3-8B79-37D633B846F1}">
-                <asvg:svgBlip xmlns:asvg="http://schemas.microsoft.com/office/drawing/2016/SVG/main" r:embed="rId4"/>
+                <asvg:svgBlip xmlns:asvg="http://schemas.microsoft.com/office/drawing/2016/SVG/main" r:embed="rId5"/>
               </a:ext>
             </a:extLst>
           </a:blip>
@@ -11906,9 +11917,12 @@
             <a:buNone/>
           </a:pPr>
           <a:r>
-            <a:rPr lang="it-IT" sz="2300" kern="1200" dirty="0"/>
+            <a:rPr lang="it-IT" sz="2300" kern="1200" dirty="0">
+              <a:hlinkClick xmlns:r="http://schemas.openxmlformats.org/officeDocument/2006/relationships" r:id="rId1"/>
+            </a:rPr>
             <a:t>https://unsplash.com/developers#</a:t>
           </a:r>
+          <a:endParaRPr lang="it-IT" sz="2300" kern="1200" dirty="0"/>
         </a:p>
       </dsp:txBody>
       <dsp:txXfrm rot="10800000">
@@ -11930,10 +11944,10 @@
           <a:avLst/>
         </a:prstGeom>
         <a:blipFill>
-          <a:blip xmlns:r="http://schemas.openxmlformats.org/officeDocument/2006/relationships" r:embed="rId1">
+          <a:blip xmlns:r="http://schemas.openxmlformats.org/officeDocument/2006/relationships" r:embed="rId2">
             <a:extLst>
               <a:ext uri="{96DAC541-7B7A-43D3-8B79-37D633B846F1}">
-                <asvg:svgBlip xmlns:asvg="http://schemas.microsoft.com/office/drawing/2016/SVG/main" r:embed="rId2"/>
+                <asvg:svgBlip xmlns:asvg="http://schemas.microsoft.com/office/drawing/2016/SVG/main" r:embed="rId3"/>
               </a:ext>
             </a:extLst>
           </a:blip>
@@ -12067,9 +12081,12 @@
             <a:buNone/>
           </a:pPr>
           <a:r>
-            <a:rPr lang="it-IT" sz="2300" kern="1200" dirty="0"/>
+            <a:rPr lang="it-IT" sz="2300" kern="1200" dirty="0">
+              <a:hlinkClick xmlns:r="http://schemas.openxmlformats.org/officeDocument/2006/relationships" r:id="rId1"/>
+            </a:rPr>
             <a:t>https://mailtrap.io/home</a:t>
           </a:r>
+          <a:endParaRPr lang="it-IT" sz="2300" kern="1200" dirty="0"/>
         </a:p>
       </dsp:txBody>
       <dsp:txXfrm rot="10800000">
@@ -12091,10 +12108,10 @@
           <a:avLst/>
         </a:prstGeom>
         <a:blipFill>
-          <a:blip xmlns:r="http://schemas.openxmlformats.org/officeDocument/2006/relationships" r:embed="rId3">
+          <a:blip xmlns:r="http://schemas.openxmlformats.org/officeDocument/2006/relationships" r:embed="rId4">
             <a:extLst>
               <a:ext uri="{96DAC541-7B7A-43D3-8B79-37D633B846F1}">
-                <asvg:svgBlip xmlns:asvg="http://schemas.microsoft.com/office/drawing/2016/SVG/main" r:embed="rId4"/>
+                <asvg:svgBlip xmlns:asvg="http://schemas.microsoft.com/office/drawing/2016/SVG/main" r:embed="rId5"/>
               </a:ext>
             </a:extLst>
           </a:blip>
@@ -24386,7 +24403,7 @@
           <a:p>
             <a:fld id="{58AA59F6-1CAE-4105-BF13-A682BDF56E61}" type="datetimeFigureOut">
               <a:rPr lang="it-IT" smtClean="0"/>
-              <a:t>03/07/2025</a:t>
+              <a:t>05/07/2025</a:t>
             </a:fld>
             <a:endParaRPr lang="it-IT"/>
           </a:p>
@@ -24800,7 +24817,7 @@
           <a:p>
             <a:fld id="{548CAA91-D4F9-47E3-9A05-87A265D0B89B}" type="datetimeFigureOut">
               <a:rPr lang="it-IT" smtClean="0"/>
-              <a:t>03/07/2025</a:t>
+              <a:t>05/07/2025</a:t>
             </a:fld>
             <a:endParaRPr lang="it-IT"/>
           </a:p>
@@ -24998,7 +25015,7 @@
           <a:p>
             <a:fld id="{548CAA91-D4F9-47E3-9A05-87A265D0B89B}" type="datetimeFigureOut">
               <a:rPr lang="it-IT" smtClean="0"/>
-              <a:t>03/07/2025</a:t>
+              <a:t>05/07/2025</a:t>
             </a:fld>
             <a:endParaRPr lang="it-IT"/>
           </a:p>
@@ -25206,7 +25223,7 @@
           <a:p>
             <a:fld id="{548CAA91-D4F9-47E3-9A05-87A265D0B89B}" type="datetimeFigureOut">
               <a:rPr lang="it-IT" smtClean="0"/>
-              <a:t>03/07/2025</a:t>
+              <a:t>05/07/2025</a:t>
             </a:fld>
             <a:endParaRPr lang="it-IT"/>
           </a:p>
@@ -25404,7 +25421,7 @@
           <a:p>
             <a:fld id="{548CAA91-D4F9-47E3-9A05-87A265D0B89B}" type="datetimeFigureOut">
               <a:rPr lang="it-IT" smtClean="0"/>
-              <a:t>03/07/2025</a:t>
+              <a:t>05/07/2025</a:t>
             </a:fld>
             <a:endParaRPr lang="it-IT"/>
           </a:p>
@@ -25679,7 +25696,7 @@
           <a:p>
             <a:fld id="{548CAA91-D4F9-47E3-9A05-87A265D0B89B}" type="datetimeFigureOut">
               <a:rPr lang="it-IT" smtClean="0"/>
-              <a:t>03/07/2025</a:t>
+              <a:t>05/07/2025</a:t>
             </a:fld>
             <a:endParaRPr lang="it-IT"/>
           </a:p>
@@ -25944,7 +25961,7 @@
           <a:p>
             <a:fld id="{548CAA91-D4F9-47E3-9A05-87A265D0B89B}" type="datetimeFigureOut">
               <a:rPr lang="it-IT" smtClean="0"/>
-              <a:t>03/07/2025</a:t>
+              <a:t>05/07/2025</a:t>
             </a:fld>
             <a:endParaRPr lang="it-IT"/>
           </a:p>
@@ -26356,7 +26373,7 @@
           <a:p>
             <a:fld id="{548CAA91-D4F9-47E3-9A05-87A265D0B89B}" type="datetimeFigureOut">
               <a:rPr lang="it-IT" smtClean="0"/>
-              <a:t>03/07/2025</a:t>
+              <a:t>05/07/2025</a:t>
             </a:fld>
             <a:endParaRPr lang="it-IT"/>
           </a:p>
@@ -26497,7 +26514,7 @@
           <a:p>
             <a:fld id="{548CAA91-D4F9-47E3-9A05-87A265D0B89B}" type="datetimeFigureOut">
               <a:rPr lang="it-IT" smtClean="0"/>
-              <a:t>03/07/2025</a:t>
+              <a:t>05/07/2025</a:t>
             </a:fld>
             <a:endParaRPr lang="it-IT"/>
           </a:p>
@@ -26610,7 +26627,7 @@
           <a:p>
             <a:fld id="{548CAA91-D4F9-47E3-9A05-87A265D0B89B}" type="datetimeFigureOut">
               <a:rPr lang="it-IT" smtClean="0"/>
-              <a:t>03/07/2025</a:t>
+              <a:t>05/07/2025</a:t>
             </a:fld>
             <a:endParaRPr lang="it-IT"/>
           </a:p>
@@ -26921,7 +26938,7 @@
           <a:p>
             <a:fld id="{548CAA91-D4F9-47E3-9A05-87A265D0B89B}" type="datetimeFigureOut">
               <a:rPr lang="it-IT" smtClean="0"/>
-              <a:t>03/07/2025</a:t>
+              <a:t>05/07/2025</a:t>
             </a:fld>
             <a:endParaRPr lang="it-IT"/>
           </a:p>
@@ -27209,7 +27226,7 @@
           <a:p>
             <a:fld id="{548CAA91-D4F9-47E3-9A05-87A265D0B89B}" type="datetimeFigureOut">
               <a:rPr lang="it-IT" smtClean="0"/>
-              <a:t>03/07/2025</a:t>
+              <a:t>05/07/2025</a:t>
             </a:fld>
             <a:endParaRPr lang="it-IT"/>
           </a:p>
@@ -27450,7 +27467,7 @@
           <a:p>
             <a:fld id="{548CAA91-D4F9-47E3-9A05-87A265D0B89B}" type="datetimeFigureOut">
               <a:rPr lang="it-IT" smtClean="0"/>
-              <a:t>03/07/2025</a:t>
+              <a:t>05/07/2025</a:t>
             </a:fld>
             <a:endParaRPr lang="it-IT"/>
           </a:p>
@@ -27938,6 +27955,636 @@
     <p:extLst>
       <p:ext uri="{BB962C8B-B14F-4D97-AF65-F5344CB8AC3E}">
         <p14:creationId xmlns:p14="http://schemas.microsoft.com/office/powerpoint/2010/main" val="3935383393"/>
+      </p:ext>
+    </p:extLst>
+  </p:cSld>
+  <p:clrMapOvr>
+    <a:masterClrMapping/>
+  </p:clrMapOvr>
+</p:sld>
+</file>
+
+<file path=ppt/slides/slide10.xml><?xml version="1.0" encoding="utf-8"?>
+<p:sld xmlns:a="http://schemas.openxmlformats.org/drawingml/2006/main" xmlns:r="http://schemas.openxmlformats.org/officeDocument/2006/relationships" xmlns:p="http://schemas.openxmlformats.org/presentationml/2006/main">
+  <p:cSld>
+    <p:bg>
+      <p:bgPr>
+        <a:solidFill>
+          <a:schemeClr val="bg1"/>
+        </a:solidFill>
+        <a:effectLst/>
+      </p:bgPr>
+    </p:bg>
+    <p:spTree>
+      <p:nvGrpSpPr>
+        <p:cNvPr id="1" name=""/>
+        <p:cNvGrpSpPr/>
+        <p:nvPr/>
+      </p:nvGrpSpPr>
+      <p:grpSpPr>
+        <a:xfrm>
+          <a:off x="0" y="0"/>
+          <a:ext cx="0" cy="0"/>
+          <a:chOff x="0" y="0"/>
+          <a:chExt cx="0" cy="0"/>
+        </a:xfrm>
+      </p:grpSpPr>
+      <p:sp useBgFill="1">
+        <p:nvSpPr>
+          <p:cNvPr id="12" name="Rectangle 11">
+            <a:extLst>
+              <a:ext uri="{FF2B5EF4-FFF2-40B4-BE49-F238E27FC236}">
+                <a16:creationId xmlns:a16="http://schemas.microsoft.com/office/drawing/2014/main" id="{C4879EFC-8E62-4E00-973C-C45EE9EC676D}"/>
+              </a:ext>
+              <a:ext uri="{C183D7F6-B498-43B3-948B-1728B52AA6E4}">
+                <adec:decorative xmlns:adec="http://schemas.microsoft.com/office/drawing/2017/decorative" val="1"/>
+              </a:ext>
+            </a:extLst>
+          </p:cNvPr>
+          <p:cNvSpPr>
+            <a:spLocks noGrp="1" noRot="1" noChangeAspect="1" noMove="1" noResize="1" noEditPoints="1" noAdjustHandles="1" noChangeArrowheads="1" noChangeShapeType="1" noTextEdit="1"/>
+          </p:cNvSpPr>
+          <p:nvPr>
+            <p:extLst>
+              <p:ext uri="{386F3935-93C4-4BCD-93E2-E3B085C9AB24}">
+                <p16:designElem xmlns:p16="http://schemas.microsoft.com/office/powerpoint/2015/main" val="1"/>
+              </p:ext>
+            </p:extLst>
+          </p:nvPr>
+        </p:nvSpPr>
+        <p:spPr>
+          <a:xfrm>
+            <a:off x="0" y="0"/>
+            <a:ext cx="12188952" cy="6858000"/>
+          </a:xfrm>
+          <a:prstGeom prst="rect">
+            <a:avLst/>
+          </a:prstGeom>
+          <a:ln>
+            <a:noFill/>
+          </a:ln>
+        </p:spPr>
+        <p:style>
+          <a:lnRef idx="2">
+            <a:schemeClr val="accent1">
+              <a:shade val="50000"/>
+            </a:schemeClr>
+          </a:lnRef>
+          <a:fillRef idx="1">
+            <a:schemeClr val="accent1"/>
+          </a:fillRef>
+          <a:effectRef idx="0">
+            <a:schemeClr val="accent1"/>
+          </a:effectRef>
+          <a:fontRef idx="minor">
+            <a:schemeClr val="lt1"/>
+          </a:fontRef>
+        </p:style>
+        <p:txBody>
+          <a:bodyPr rtlCol="0" anchor="ctr"/>
+          <a:lstStyle/>
+          <a:p>
+            <a:pPr algn="ctr"/>
+            <a:endParaRPr lang="en-US"/>
+          </a:p>
+        </p:txBody>
+      </p:sp>
+      <p:sp>
+        <p:nvSpPr>
+          <p:cNvPr id="2" name="Titolo 1">
+            <a:extLst>
+              <a:ext uri="{FF2B5EF4-FFF2-40B4-BE49-F238E27FC236}">
+                <a16:creationId xmlns:a16="http://schemas.microsoft.com/office/drawing/2014/main" id="{A03C8C39-3ECF-952E-E811-08CEC21EE78F}"/>
+              </a:ext>
+            </a:extLst>
+          </p:cNvPr>
+          <p:cNvSpPr>
+            <a:spLocks noGrp="1"/>
+          </p:cNvSpPr>
+          <p:nvPr>
+            <p:ph type="title"/>
+          </p:nvPr>
+        </p:nvSpPr>
+        <p:spPr>
+          <a:xfrm>
+            <a:off x="209891" y="371223"/>
+            <a:ext cx="2641464" cy="690662"/>
+          </a:xfrm>
+        </p:spPr>
+        <p:txBody>
+          <a:bodyPr vert="horz" lIns="91440" tIns="45720" rIns="91440" bIns="45720" rtlCol="0" anchor="ctr">
+            <a:normAutofit/>
+          </a:bodyPr>
+          <a:lstStyle/>
+          <a:p>
+            <a:pPr algn="ctr"/>
+            <a:r>
+              <a:rPr lang="en-US" sz="3200" i="1" dirty="0" err="1"/>
+              <a:t>Esempio</a:t>
+            </a:r>
+            <a:r>
+              <a:rPr lang="en-US" sz="3200" i="1" dirty="0"/>
+              <a:t>:</a:t>
+            </a:r>
+          </a:p>
+        </p:txBody>
+      </p:sp>
+      <p:sp>
+        <p:nvSpPr>
+          <p:cNvPr id="16" name="sketch line">
+            <a:extLst>
+              <a:ext uri="{FF2B5EF4-FFF2-40B4-BE49-F238E27FC236}">
+                <a16:creationId xmlns:a16="http://schemas.microsoft.com/office/drawing/2014/main" id="{D6A9C53F-5F90-40A5-8C85-5412D39C8C68}"/>
+              </a:ext>
+              <a:ext uri="{C183D7F6-B498-43B3-948B-1728B52AA6E4}">
+                <adec:decorative xmlns:adec="http://schemas.microsoft.com/office/drawing/2017/decorative" val="1"/>
+              </a:ext>
+            </a:extLst>
+          </p:cNvPr>
+          <p:cNvSpPr>
+            <a:spLocks noGrp="1" noRot="1" noChangeAspect="1" noMove="1" noResize="1" noEditPoints="1" noAdjustHandles="1" noChangeArrowheads="1" noChangeShapeType="1" noTextEdit="1"/>
+          </p:cNvSpPr>
+          <p:nvPr>
+            <p:extLst>
+              <p:ext uri="{386F3935-93C4-4BCD-93E2-E3B085C9AB24}">
+                <p16:designElem xmlns:p16="http://schemas.microsoft.com/office/powerpoint/2015/main" val="1"/>
+              </p:ext>
+            </p:extLst>
+          </p:nvPr>
+        </p:nvSpPr>
+        <p:spPr>
+          <a:xfrm>
+            <a:off x="4450080" y="1850683"/>
+            <a:ext cx="3291840" cy="18288"/>
+          </a:xfrm>
+          <a:custGeom>
+            <a:avLst/>
+            <a:gdLst>
+              <a:gd name="connsiteX0" fmla="*/ 0 w 3291840"/>
+              <a:gd name="connsiteY0" fmla="*/ 0 h 18288"/>
+              <a:gd name="connsiteX1" fmla="*/ 658368 w 3291840"/>
+              <a:gd name="connsiteY1" fmla="*/ 0 h 18288"/>
+              <a:gd name="connsiteX2" fmla="*/ 1283818 w 3291840"/>
+              <a:gd name="connsiteY2" fmla="*/ 0 h 18288"/>
+              <a:gd name="connsiteX3" fmla="*/ 1909267 w 3291840"/>
+              <a:gd name="connsiteY3" fmla="*/ 0 h 18288"/>
+              <a:gd name="connsiteX4" fmla="*/ 2633472 w 3291840"/>
+              <a:gd name="connsiteY4" fmla="*/ 0 h 18288"/>
+              <a:gd name="connsiteX5" fmla="*/ 3291840 w 3291840"/>
+              <a:gd name="connsiteY5" fmla="*/ 0 h 18288"/>
+              <a:gd name="connsiteX6" fmla="*/ 3291840 w 3291840"/>
+              <a:gd name="connsiteY6" fmla="*/ 18288 h 18288"/>
+              <a:gd name="connsiteX7" fmla="*/ 2633472 w 3291840"/>
+              <a:gd name="connsiteY7" fmla="*/ 18288 h 18288"/>
+              <a:gd name="connsiteX8" fmla="*/ 2073859 w 3291840"/>
+              <a:gd name="connsiteY8" fmla="*/ 18288 h 18288"/>
+              <a:gd name="connsiteX9" fmla="*/ 1448410 w 3291840"/>
+              <a:gd name="connsiteY9" fmla="*/ 18288 h 18288"/>
+              <a:gd name="connsiteX10" fmla="*/ 822960 w 3291840"/>
+              <a:gd name="connsiteY10" fmla="*/ 18288 h 18288"/>
+              <a:gd name="connsiteX11" fmla="*/ 0 w 3291840"/>
+              <a:gd name="connsiteY11" fmla="*/ 18288 h 18288"/>
+              <a:gd name="connsiteX12" fmla="*/ 0 w 3291840"/>
+              <a:gd name="connsiteY12" fmla="*/ 0 h 18288"/>
+            </a:gdLst>
+            <a:ahLst/>
+            <a:cxnLst>
+              <a:cxn ang="0">
+                <a:pos x="connsiteX0" y="connsiteY0"/>
+              </a:cxn>
+              <a:cxn ang="0">
+                <a:pos x="connsiteX1" y="connsiteY1"/>
+              </a:cxn>
+              <a:cxn ang="0">
+                <a:pos x="connsiteX2" y="connsiteY2"/>
+              </a:cxn>
+              <a:cxn ang="0">
+                <a:pos x="connsiteX3" y="connsiteY3"/>
+              </a:cxn>
+              <a:cxn ang="0">
+                <a:pos x="connsiteX4" y="connsiteY4"/>
+              </a:cxn>
+              <a:cxn ang="0">
+                <a:pos x="connsiteX5" y="connsiteY5"/>
+              </a:cxn>
+              <a:cxn ang="0">
+                <a:pos x="connsiteX6" y="connsiteY6"/>
+              </a:cxn>
+              <a:cxn ang="0">
+                <a:pos x="connsiteX7" y="connsiteY7"/>
+              </a:cxn>
+              <a:cxn ang="0">
+                <a:pos x="connsiteX8" y="connsiteY8"/>
+              </a:cxn>
+              <a:cxn ang="0">
+                <a:pos x="connsiteX9" y="connsiteY9"/>
+              </a:cxn>
+              <a:cxn ang="0">
+                <a:pos x="connsiteX10" y="connsiteY10"/>
+              </a:cxn>
+              <a:cxn ang="0">
+                <a:pos x="connsiteX11" y="connsiteY11"/>
+              </a:cxn>
+              <a:cxn ang="0">
+                <a:pos x="connsiteX12" y="connsiteY12"/>
+              </a:cxn>
+            </a:cxnLst>
+            <a:rect l="l" t="t" r="r" b="b"/>
+            <a:pathLst>
+              <a:path w="3291840" h="18288" fill="none" extrusionOk="0">
+                <a:moveTo>
+                  <a:pt x="0" y="0"/>
+                </a:moveTo>
+                <a:cubicBezTo>
+                  <a:pt x="173077" y="-20031"/>
+                  <a:pt x="443104" y="6424"/>
+                  <a:pt x="658368" y="0"/>
+                </a:cubicBezTo>
+                <a:cubicBezTo>
+                  <a:pt x="873632" y="-6424"/>
+                  <a:pt x="1034028" y="11764"/>
+                  <a:pt x="1283818" y="0"/>
+                </a:cubicBezTo>
+                <a:cubicBezTo>
+                  <a:pt x="1533608" y="-11764"/>
+                  <a:pt x="1691227" y="-30112"/>
+                  <a:pt x="1909267" y="0"/>
+                </a:cubicBezTo>
+                <a:cubicBezTo>
+                  <a:pt x="2127307" y="30112"/>
+                  <a:pt x="2272465" y="-18735"/>
+                  <a:pt x="2633472" y="0"/>
+                </a:cubicBezTo>
+                <a:cubicBezTo>
+                  <a:pt x="2994479" y="18735"/>
+                  <a:pt x="3023324" y="-32030"/>
+                  <a:pt x="3291840" y="0"/>
+                </a:cubicBezTo>
+                <a:cubicBezTo>
+                  <a:pt x="3291406" y="7551"/>
+                  <a:pt x="3291373" y="9822"/>
+                  <a:pt x="3291840" y="18288"/>
+                </a:cubicBezTo>
+                <a:cubicBezTo>
+                  <a:pt x="3048445" y="38989"/>
+                  <a:pt x="2846548" y="-14400"/>
+                  <a:pt x="2633472" y="18288"/>
+                </a:cubicBezTo>
+                <a:cubicBezTo>
+                  <a:pt x="2420396" y="50976"/>
+                  <a:pt x="2304099" y="6336"/>
+                  <a:pt x="2073859" y="18288"/>
+                </a:cubicBezTo>
+                <a:cubicBezTo>
+                  <a:pt x="1843619" y="30240"/>
+                  <a:pt x="1706926" y="10778"/>
+                  <a:pt x="1448410" y="18288"/>
+                </a:cubicBezTo>
+                <a:cubicBezTo>
+                  <a:pt x="1189894" y="25798"/>
+                  <a:pt x="1002278" y="8992"/>
+                  <a:pt x="822960" y="18288"/>
+                </a:cubicBezTo>
+                <a:cubicBezTo>
+                  <a:pt x="643642" y="27585"/>
+                  <a:pt x="307039" y="38051"/>
+                  <a:pt x="0" y="18288"/>
+                </a:cubicBezTo>
+                <a:cubicBezTo>
+                  <a:pt x="60" y="11696"/>
+                  <a:pt x="66" y="3758"/>
+                  <a:pt x="0" y="0"/>
+                </a:cubicBezTo>
+                <a:close/>
+              </a:path>
+              <a:path w="3291840" h="18288" stroke="0" extrusionOk="0">
+                <a:moveTo>
+                  <a:pt x="0" y="0"/>
+                </a:moveTo>
+                <a:cubicBezTo>
+                  <a:pt x="195850" y="28018"/>
+                  <a:pt x="434891" y="17390"/>
+                  <a:pt x="592531" y="0"/>
+                </a:cubicBezTo>
+                <a:cubicBezTo>
+                  <a:pt x="750171" y="-17390"/>
+                  <a:pt x="1018709" y="32200"/>
+                  <a:pt x="1316736" y="0"/>
+                </a:cubicBezTo>
+                <a:cubicBezTo>
+                  <a:pt x="1614763" y="-32200"/>
+                  <a:pt x="1696480" y="-11367"/>
+                  <a:pt x="1876349" y="0"/>
+                </a:cubicBezTo>
+                <a:cubicBezTo>
+                  <a:pt x="2056218" y="11367"/>
+                  <a:pt x="2193364" y="13433"/>
+                  <a:pt x="2435962" y="0"/>
+                </a:cubicBezTo>
+                <a:cubicBezTo>
+                  <a:pt x="2678560" y="-13433"/>
+                  <a:pt x="3010901" y="-42367"/>
+                  <a:pt x="3291840" y="0"/>
+                </a:cubicBezTo>
+                <a:cubicBezTo>
+                  <a:pt x="3291758" y="4406"/>
+                  <a:pt x="3291751" y="9982"/>
+                  <a:pt x="3291840" y="18288"/>
+                </a:cubicBezTo>
+                <a:cubicBezTo>
+                  <a:pt x="3108993" y="14228"/>
+                  <a:pt x="2952658" y="46900"/>
+                  <a:pt x="2666390" y="18288"/>
+                </a:cubicBezTo>
+                <a:cubicBezTo>
+                  <a:pt x="2380122" y="-10324"/>
+                  <a:pt x="2263855" y="41055"/>
+                  <a:pt x="2040941" y="18288"/>
+                </a:cubicBezTo>
+                <a:cubicBezTo>
+                  <a:pt x="1818027" y="-4479"/>
+                  <a:pt x="1675097" y="6509"/>
+                  <a:pt x="1415491" y="18288"/>
+                </a:cubicBezTo>
+                <a:cubicBezTo>
+                  <a:pt x="1155885" y="30068"/>
+                  <a:pt x="852976" y="36210"/>
+                  <a:pt x="691286" y="18288"/>
+                </a:cubicBezTo>
+                <a:cubicBezTo>
+                  <a:pt x="529596" y="366"/>
+                  <a:pt x="187183" y="13912"/>
+                  <a:pt x="0" y="18288"/>
+                </a:cubicBezTo>
+                <a:cubicBezTo>
+                  <a:pt x="189" y="14288"/>
+                  <a:pt x="-703" y="3747"/>
+                  <a:pt x="0" y="0"/>
+                </a:cubicBezTo>
+                <a:close/>
+              </a:path>
+            </a:pathLst>
+          </a:custGeom>
+          <a:solidFill>
+            <a:schemeClr val="accent2"/>
+          </a:solidFill>
+          <a:ln w="41275" cap="rnd">
+            <a:solidFill>
+              <a:schemeClr val="accent2"/>
+            </a:solidFill>
+            <a:round/>
+            <a:extLst>
+              <a:ext uri="{C807C97D-BFC1-408E-A445-0C87EB9F89A2}">
+                <ask:lineSketchStyleProps xmlns:ask="http://schemas.microsoft.com/office/drawing/2018/sketchyshapes" sd="2863741219">
+                  <a:prstGeom prst="rect">
+                    <a:avLst/>
+                  </a:prstGeom>
+                  <ask:type>
+                    <ask:lineSketchFreehand/>
+                  </ask:type>
+                </ask:lineSketchStyleProps>
+              </a:ext>
+            </a:extLst>
+          </a:ln>
+        </p:spPr>
+        <p:style>
+          <a:lnRef idx="2">
+            <a:schemeClr val="accent1">
+              <a:shade val="50000"/>
+            </a:schemeClr>
+          </a:lnRef>
+          <a:fillRef idx="1">
+            <a:schemeClr val="accent1"/>
+          </a:fillRef>
+          <a:effectRef idx="0">
+            <a:schemeClr val="accent1"/>
+          </a:effectRef>
+          <a:fontRef idx="minor">
+            <a:schemeClr val="lt1"/>
+          </a:fontRef>
+        </p:style>
+        <p:txBody>
+          <a:bodyPr rtlCol="0" anchor="ctr"/>
+          <a:lstStyle/>
+          <a:p>
+            <a:pPr algn="ctr"/>
+            <a:endParaRPr lang="en-US"/>
+          </a:p>
+        </p:txBody>
+      </p:sp>
+      <p:pic>
+        <p:nvPicPr>
+          <p:cNvPr id="5" name="Segnaposto contenuto 4" descr="Immagine che contiene testo, schermata, software, Icona del computer&#10;&#10;Il contenuto generato dall'IA potrebbe non essere corretto.">
+            <a:extLst>
+              <a:ext uri="{FF2B5EF4-FFF2-40B4-BE49-F238E27FC236}">
+                <a16:creationId xmlns:a16="http://schemas.microsoft.com/office/drawing/2014/main" id="{A07F0C5E-71BA-BAC8-69EE-1DBFB83E1B81}"/>
+              </a:ext>
+            </a:extLst>
+          </p:cNvPr>
+          <p:cNvPicPr>
+            <a:picLocks noGrp="1" noChangeAspect="1"/>
+          </p:cNvPicPr>
+          <p:nvPr>
+            <p:ph idx="1"/>
+          </p:nvPr>
+        </p:nvPicPr>
+        <p:blipFill>
+          <a:blip r:embed="rId2">
+            <a:extLst>
+              <a:ext uri="{28A0092B-C50C-407E-A947-70E740481C1C}">
+                <a14:useLocalDpi xmlns:a14="http://schemas.microsoft.com/office/drawing/2010/main" val="0"/>
+              </a:ext>
+            </a:extLst>
+          </a:blip>
+          <a:srcRect l="36532"/>
+          <a:stretch>
+            <a:fillRect/>
+          </a:stretch>
+        </p:blipFill>
+        <p:spPr>
+          <a:xfrm>
+            <a:off x="3555712" y="649771"/>
+            <a:ext cx="8038524" cy="4717900"/>
+          </a:xfrm>
+          <a:prstGeom prst="rect">
+            <a:avLst/>
+          </a:prstGeom>
+          <a:ln w="228600" cap="sq" cmpd="thickThin">
+            <a:solidFill>
+              <a:srgbClr val="000000"/>
+            </a:solidFill>
+            <a:prstDash val="solid"/>
+            <a:miter lim="800000"/>
+          </a:ln>
+          <a:effectLst>
+            <a:innerShdw blurRad="76200">
+              <a:srgbClr val="000000"/>
+            </a:innerShdw>
+          </a:effectLst>
+        </p:spPr>
+      </p:pic>
+      <p:pic>
+        <p:nvPicPr>
+          <p:cNvPr id="7" name="Immagine 6" descr="Immagine che contiene testo, schermata, Carattere, Elementi grafici&#10;&#10;Il contenuto generato dall'IA potrebbe non essere corretto.">
+            <a:extLst>
+              <a:ext uri="{FF2B5EF4-FFF2-40B4-BE49-F238E27FC236}">
+                <a16:creationId xmlns:a16="http://schemas.microsoft.com/office/drawing/2014/main" id="{470AED21-719E-1512-F6E0-60A9B6D90479}"/>
+              </a:ext>
+            </a:extLst>
+          </p:cNvPr>
+          <p:cNvPicPr>
+            <a:picLocks noChangeAspect="1"/>
+          </p:cNvPicPr>
+          <p:nvPr/>
+        </p:nvPicPr>
+        <p:blipFill>
+          <a:blip r:embed="rId3">
+            <a:extLst>
+              <a:ext uri="{28A0092B-C50C-407E-A947-70E740481C1C}">
+                <a14:useLocalDpi xmlns:a14="http://schemas.microsoft.com/office/drawing/2010/main" val="0"/>
+              </a:ext>
+            </a:extLst>
+          </a:blip>
+          <a:stretch>
+            <a:fillRect/>
+          </a:stretch>
+        </p:blipFill>
+        <p:spPr>
+          <a:xfrm>
+            <a:off x="156085" y="2829310"/>
+            <a:ext cx="4293995" cy="3852027"/>
+          </a:xfrm>
+          <a:prstGeom prst="ellipse">
+            <a:avLst/>
+          </a:prstGeom>
+          <a:ln w="63500" cap="rnd">
+            <a:solidFill>
+              <a:srgbClr val="333333"/>
+            </a:solidFill>
+          </a:ln>
+          <a:effectLst>
+            <a:outerShdw blurRad="381000" dist="292100" dir="5400000" sx="-80000" sy="-18000" rotWithShape="0">
+              <a:srgbClr val="000000">
+                <a:alpha val="22000"/>
+              </a:srgbClr>
+            </a:outerShdw>
+          </a:effectLst>
+          <a:scene3d>
+            <a:camera prst="orthographicFront"/>
+            <a:lightRig rig="contrasting" dir="t">
+              <a:rot lat="0" lon="0" rev="3000000"/>
+            </a:lightRig>
+          </a:scene3d>
+          <a:sp3d contourW="7620">
+            <a:bevelT w="95250" h="31750"/>
+            <a:contourClr>
+              <a:srgbClr val="333333"/>
+            </a:contourClr>
+          </a:sp3d>
+        </p:spPr>
+      </p:pic>
+      <p:sp>
+        <p:nvSpPr>
+          <p:cNvPr id="20" name="Freccia in giù 19">
+            <a:extLst>
+              <a:ext uri="{FF2B5EF4-FFF2-40B4-BE49-F238E27FC236}">
+                <a16:creationId xmlns:a16="http://schemas.microsoft.com/office/drawing/2014/main" id="{826503BA-CEF4-6405-3C1D-400148EBDA1A}"/>
+              </a:ext>
+            </a:extLst>
+          </p:cNvPr>
+          <p:cNvSpPr/>
+          <p:nvPr/>
+        </p:nvSpPr>
+        <p:spPr>
+          <a:xfrm>
+            <a:off x="1343810" y="4227871"/>
+            <a:ext cx="593145" cy="609600"/>
+          </a:xfrm>
+          <a:prstGeom prst="downArrow">
+            <a:avLst/>
+          </a:prstGeom>
+          <a:solidFill>
+            <a:schemeClr val="accent2"/>
+          </a:solidFill>
+        </p:spPr>
+        <p:style>
+          <a:lnRef idx="2">
+            <a:schemeClr val="accent1">
+              <a:shade val="15000"/>
+            </a:schemeClr>
+          </a:lnRef>
+          <a:fillRef idx="1">
+            <a:schemeClr val="accent1"/>
+          </a:fillRef>
+          <a:effectRef idx="0">
+            <a:schemeClr val="accent1"/>
+          </a:effectRef>
+          <a:fontRef idx="minor">
+            <a:schemeClr val="lt1"/>
+          </a:fontRef>
+        </p:style>
+        <p:txBody>
+          <a:bodyPr rtlCol="0" anchor="ctr"/>
+          <a:lstStyle/>
+          <a:p>
+            <a:pPr algn="ctr"/>
+            <a:endParaRPr lang="it-IT"/>
+          </a:p>
+        </p:txBody>
+      </p:sp>
+      <p:sp>
+        <p:nvSpPr>
+          <p:cNvPr id="21" name="Freccia in giù 20">
+            <a:extLst>
+              <a:ext uri="{FF2B5EF4-FFF2-40B4-BE49-F238E27FC236}">
+                <a16:creationId xmlns:a16="http://schemas.microsoft.com/office/drawing/2014/main" id="{66266777-D4B8-0025-B04E-25A27078C40F}"/>
+              </a:ext>
+            </a:extLst>
+          </p:cNvPr>
+          <p:cNvSpPr/>
+          <p:nvPr/>
+        </p:nvSpPr>
+        <p:spPr>
+          <a:xfrm rot="16200000">
+            <a:off x="2930729" y="1461570"/>
+            <a:ext cx="596225" cy="653742"/>
+          </a:xfrm>
+          <a:prstGeom prst="downArrow">
+            <a:avLst/>
+          </a:prstGeom>
+          <a:solidFill>
+            <a:schemeClr val="accent2"/>
+          </a:solidFill>
+        </p:spPr>
+        <p:style>
+          <a:lnRef idx="2">
+            <a:schemeClr val="accent1">
+              <a:shade val="15000"/>
+            </a:schemeClr>
+          </a:lnRef>
+          <a:fillRef idx="1">
+            <a:schemeClr val="accent1"/>
+          </a:fillRef>
+          <a:effectRef idx="0">
+            <a:schemeClr val="accent1"/>
+          </a:effectRef>
+          <a:fontRef idx="minor">
+            <a:schemeClr val="lt1"/>
+          </a:fontRef>
+        </p:style>
+        <p:txBody>
+          <a:bodyPr rtlCol="0" anchor="ctr"/>
+          <a:lstStyle/>
+          <a:p>
+            <a:pPr algn="ctr"/>
+            <a:endParaRPr lang="it-IT"/>
+          </a:p>
+        </p:txBody>
+      </p:sp>
+    </p:spTree>
+    <p:extLst>
+      <p:ext uri="{BB962C8B-B14F-4D97-AF65-F5344CB8AC3E}">
+        <p14:creationId xmlns:p14="http://schemas.microsoft.com/office/powerpoint/2010/main" val="2735123809"/>
       </p:ext>
     </p:extLst>
   </p:cSld>
@@ -29070,7 +29717,7 @@
             <p:ph idx="1"/>
             <p:extLst>
               <p:ext uri="{D42A27DB-BD31-4B8C-83A1-F6EECF244321}">
-                <p14:modId xmlns:p14="http://schemas.microsoft.com/office/powerpoint/2010/main" val="486998143"/>
+                <p14:modId xmlns:p14="http://schemas.microsoft.com/office/powerpoint/2010/main" val="1236790653"/>
               </p:ext>
             </p:extLst>
           </p:nvPr>

</xml_diff>